<commit_message>
Added notes from class
</commit_message>
<xml_diff>
--- a/Trunk/Getting Started Material/DCAF Training/7 Dynamic Modules.pptx
+++ b/Trunk/Getting Started Material/DCAF Training/7 Dynamic Modules.pptx
@@ -21,16 +21,18 @@
     <p:sldId id="406" r:id="rId15"/>
     <p:sldId id="412" r:id="rId16"/>
     <p:sldId id="413" r:id="rId17"/>
-    <p:sldId id="408" r:id="rId18"/>
-    <p:sldId id="407" r:id="rId19"/>
-    <p:sldId id="409" r:id="rId20"/>
-    <p:sldId id="410" r:id="rId21"/>
-    <p:sldId id="411" r:id="rId22"/>
-    <p:sldId id="415" r:id="rId23"/>
-    <p:sldId id="418" r:id="rId24"/>
-    <p:sldId id="417" r:id="rId25"/>
-    <p:sldId id="420" r:id="rId26"/>
-    <p:sldId id="422" r:id="rId27"/>
+    <p:sldId id="423" r:id="rId18"/>
+    <p:sldId id="424" r:id="rId19"/>
+    <p:sldId id="408" r:id="rId20"/>
+    <p:sldId id="407" r:id="rId21"/>
+    <p:sldId id="409" r:id="rId22"/>
+    <p:sldId id="410" r:id="rId23"/>
+    <p:sldId id="411" r:id="rId24"/>
+    <p:sldId id="415" r:id="rId25"/>
+    <p:sldId id="418" r:id="rId26"/>
+    <p:sldId id="417" r:id="rId27"/>
+    <p:sldId id="420" r:id="rId28"/>
+    <p:sldId id="422" r:id="rId29"/>
   </p:sldIdLst>
   <p:sldSz cx="12192000" cy="6858000"/>
   <p:notesSz cx="6858000" cy="9144000"/>
@@ -3272,7 +3274,7 @@
           <a:p>
             <a:fld id="{9B35DD74-3974-4499-A04F-B283A29442F2}" type="datetimeFigureOut">
               <a:rPr lang="en-US" smtClean="0"/>
-              <a:t>7/9/2018</a:t>
+              <a:t>7/17/2018</a:t>
             </a:fld>
             <a:endParaRPr lang="en-US"/>
           </a:p>
@@ -4263,7 +4265,7 @@
           <a:p>
             <a:fld id="{9B35DD74-3974-4499-A04F-B283A29442F2}" type="datetimeFigureOut">
               <a:rPr lang="en-US" smtClean="0"/>
-              <a:t>7/9/2018</a:t>
+              <a:t>7/17/2018</a:t>
             </a:fld>
             <a:endParaRPr lang="en-US"/>
           </a:p>
@@ -7454,6 +7456,18 @@
           <a:p>
             <a:r>
               <a:rPr lang="en-US" dirty="0"/>
+              <a:t>Override Get Line Name</a:t>
+            </a:r>
+          </a:p>
+          <a:p>
+            <a:r>
+              <a:rPr lang="en-US" dirty="0"/>
+              <a:t>Update Get channels from line</a:t>
+            </a:r>
+          </a:p>
+          <a:p>
+            <a:r>
+              <a:rPr lang="en-US" dirty="0"/>
               <a:t>Implement to String and from String</a:t>
             </a:r>
           </a:p>
@@ -7800,10 +7814,10 @@
       </p:grpSpPr>
       <p:sp>
         <p:nvSpPr>
-          <p:cNvPr id="4" name="Text Placeholder 3">
+          <p:cNvPr id="2" name="Title 1">
             <a:extLst>
               <a:ext uri="{FF2B5EF4-FFF2-40B4-BE49-F238E27FC236}">
-                <a16:creationId xmlns:a16="http://schemas.microsoft.com/office/drawing/2014/main" id="{05F0C360-DA34-4096-A9CE-E2369516CE5A}"/>
+                <a16:creationId xmlns:a16="http://schemas.microsoft.com/office/drawing/2014/main" id="{7808591E-0C79-4261-A68E-A20FC8136D9A}"/>
               </a:ext>
             </a:extLst>
           </p:cNvPr>
@@ -7811,7 +7825,7 @@
             <a:spLocks noGrp="1"/>
           </p:cNvSpPr>
           <p:nvPr>
-            <p:ph type="body" sz="quarter" idx="10"/>
+            <p:ph type="title"/>
           </p:nvPr>
         </p:nvSpPr>
         <p:spPr/>
@@ -7821,15 +7835,40 @@
           <a:p>
             <a:r>
               <a:rPr lang="en-US" dirty="0"/>
-              <a:t>Exercise 2: Multiplexer Runtime</a:t>
-            </a:r>
+              <a:t>Init and mapping</a:t>
+            </a:r>
+          </a:p>
+        </p:txBody>
+      </p:sp>
+      <p:sp>
+        <p:nvSpPr>
+          <p:cNvPr id="3" name="Content Placeholder 2">
+            <a:extLst>
+              <a:ext uri="{FF2B5EF4-FFF2-40B4-BE49-F238E27FC236}">
+                <a16:creationId xmlns:a16="http://schemas.microsoft.com/office/drawing/2014/main" id="{19E20F9E-D11A-4187-BDE7-FA8179DD1125}"/>
+              </a:ext>
+            </a:extLst>
+          </p:cNvPr>
+          <p:cNvSpPr>
+            <a:spLocks noGrp="1"/>
+          </p:cNvSpPr>
+          <p:nvPr>
+            <p:ph idx="1"/>
+          </p:nvPr>
+        </p:nvSpPr>
+        <p:spPr/>
+        <p:txBody>
+          <a:bodyPr/>
+          <a:lstStyle/>
+          <a:p>
+            <a:endParaRPr lang="en-US"/>
           </a:p>
         </p:txBody>
       </p:sp>
     </p:spTree>
     <p:extLst>
       <p:ext uri="{BB962C8B-B14F-4D97-AF65-F5344CB8AC3E}">
-        <p14:creationId xmlns:p14="http://schemas.microsoft.com/office/powerpoint/2010/main" val="3329254432"/>
+        <p14:creationId xmlns:p14="http://schemas.microsoft.com/office/powerpoint/2010/main" val="3364054645"/>
       </p:ext>
     </p:extLst>
   </p:cSld>
@@ -7861,7 +7900,7 @@
           <p:cNvPr id="2" name="Title 1">
             <a:extLst>
               <a:ext uri="{FF2B5EF4-FFF2-40B4-BE49-F238E27FC236}">
-                <a16:creationId xmlns:a16="http://schemas.microsoft.com/office/drawing/2014/main" id="{EFD357B1-2887-4913-9DD8-C0EE80A0C18F}"/>
+                <a16:creationId xmlns:a16="http://schemas.microsoft.com/office/drawing/2014/main" id="{25F5A068-3F29-4BB4-835C-397B86BD7113}"/>
               </a:ext>
             </a:extLst>
           </p:cNvPr>
@@ -7879,7 +7918,7 @@
           <a:p>
             <a:r>
               <a:rPr lang="en-US" dirty="0"/>
-              <a:t>Exercise 2: Multiplexer Runtime</a:t>
+              <a:t>Runtime Example</a:t>
             </a:r>
           </a:p>
         </p:txBody>
@@ -7889,7 +7928,7 @@
           <p:cNvPr id="3" name="Content Placeholder 2">
             <a:extLst>
               <a:ext uri="{FF2B5EF4-FFF2-40B4-BE49-F238E27FC236}">
-                <a16:creationId xmlns:a16="http://schemas.microsoft.com/office/drawing/2014/main" id="{AD40C41E-1B99-4FF4-A8E0-62D686DE4465}"/>
+                <a16:creationId xmlns:a16="http://schemas.microsoft.com/office/drawing/2014/main" id="{DBA2C696-1F91-4D13-99EE-8954CD6397CB}"/>
               </a:ext>
             </a:extLst>
           </p:cNvPr>
@@ -7905,29 +7944,14 @@
           <a:bodyPr/>
           <a:lstStyle/>
           <a:p>
-            <a:r>
-              <a:rPr lang="en-US" dirty="0"/>
-              <a:t>Initialize the runtime class with the scaling value</a:t>
-            </a:r>
-          </a:p>
-          <a:p>
-            <a:r>
-              <a:rPr lang="en-US" dirty="0"/>
-              <a:t>Write the runtime to multiplex channels</a:t>
-            </a:r>
-          </a:p>
-          <a:p>
-            <a:r>
-              <a:rPr lang="en-US" dirty="0"/>
-              <a:t>Unit test the runtime. </a:t>
-            </a:r>
+            <a:endParaRPr lang="en-US"/>
           </a:p>
         </p:txBody>
       </p:sp>
     </p:spTree>
     <p:extLst>
       <p:ext uri="{BB962C8B-B14F-4D97-AF65-F5344CB8AC3E}">
-        <p14:creationId xmlns:p14="http://schemas.microsoft.com/office/powerpoint/2010/main" val="2925313803"/>
+        <p14:creationId xmlns:p14="http://schemas.microsoft.com/office/powerpoint/2010/main" val="1150957770"/>
       </p:ext>
     </p:extLst>
   </p:cSld>
@@ -7956,10 +7980,10 @@
       </p:grpSpPr>
       <p:sp>
         <p:nvSpPr>
-          <p:cNvPr id="2" name="Title 1">
+          <p:cNvPr id="4" name="Text Placeholder 3">
             <a:extLst>
               <a:ext uri="{FF2B5EF4-FFF2-40B4-BE49-F238E27FC236}">
-                <a16:creationId xmlns:a16="http://schemas.microsoft.com/office/drawing/2014/main" id="{05154675-5137-414E-87EB-D615864DF94D}"/>
+                <a16:creationId xmlns:a16="http://schemas.microsoft.com/office/drawing/2014/main" id="{05F0C360-DA34-4096-A9CE-E2369516CE5A}"/>
               </a:ext>
             </a:extLst>
           </p:cNvPr>
@@ -7967,7 +7991,7 @@
             <a:spLocks noGrp="1"/>
           </p:cNvSpPr>
           <p:nvPr>
-            <p:ph type="title"/>
+            <p:ph type="body" sz="quarter" idx="10"/>
           </p:nvPr>
         </p:nvSpPr>
         <p:spPr/>
@@ -7977,47 +8001,15 @@
           <a:p>
             <a:r>
               <a:rPr lang="en-US" dirty="0"/>
-              <a:t>Editor Node</a:t>
-            </a:r>
-          </a:p>
-        </p:txBody>
-      </p:sp>
-      <p:pic>
-        <p:nvPicPr>
-          <p:cNvPr id="5" name="Content Placeholder 4">
-            <a:extLst>
-              <a:ext uri="{FF2B5EF4-FFF2-40B4-BE49-F238E27FC236}">
-                <a16:creationId xmlns:a16="http://schemas.microsoft.com/office/drawing/2014/main" id="{A0D8EE56-EA84-4B7B-AE29-9D9E49E51BDB}"/>
-              </a:ext>
-            </a:extLst>
-          </p:cNvPr>
-          <p:cNvPicPr>
-            <a:picLocks noGrp="1" noChangeAspect="1"/>
-          </p:cNvPicPr>
-          <p:nvPr>
-            <p:ph idx="1"/>
-          </p:nvPr>
-        </p:nvPicPr>
-        <p:blipFill>
-          <a:blip r:embed="rId2"/>
-          <a:stretch>
-            <a:fillRect/>
-          </a:stretch>
-        </p:blipFill>
-        <p:spPr>
-          <a:xfrm>
-            <a:off x="724480" y="974725"/>
-            <a:ext cx="10733515" cy="4897438"/>
-          </a:xfrm>
-          <a:prstGeom prst="rect">
-            <a:avLst/>
-          </a:prstGeom>
-        </p:spPr>
-      </p:pic>
+              <a:t>Exercise 2: Multiplexer Runtime</a:t>
+            </a:r>
+          </a:p>
+        </p:txBody>
+      </p:sp>
     </p:spTree>
     <p:extLst>
       <p:ext uri="{BB962C8B-B14F-4D97-AF65-F5344CB8AC3E}">
-        <p14:creationId xmlns:p14="http://schemas.microsoft.com/office/powerpoint/2010/main" val="1324204237"/>
+        <p14:creationId xmlns:p14="http://schemas.microsoft.com/office/powerpoint/2010/main" val="3329254432"/>
       </p:ext>
     </p:extLst>
   </p:cSld>
@@ -8159,7 +8151,7 @@
           <p:cNvPr id="2" name="Title 1">
             <a:extLst>
               <a:ext uri="{FF2B5EF4-FFF2-40B4-BE49-F238E27FC236}">
-                <a16:creationId xmlns:a16="http://schemas.microsoft.com/office/drawing/2014/main" id="{62D72453-29A3-44AC-A32B-D6DA3958C0AB}"/>
+                <a16:creationId xmlns:a16="http://schemas.microsoft.com/office/drawing/2014/main" id="{EFD357B1-2887-4913-9DD8-C0EE80A0C18F}"/>
               </a:ext>
             </a:extLst>
           </p:cNvPr>
@@ -8177,47 +8169,55 @@
           <a:p>
             <a:r>
               <a:rPr lang="en-US" dirty="0"/>
-              <a:t>Define Columns</a:t>
-            </a:r>
-          </a:p>
-        </p:txBody>
-      </p:sp>
-      <p:pic>
-        <p:nvPicPr>
-          <p:cNvPr id="4" name="Content Placeholder 3">
+              <a:t>Exercise 2: Multiplexer Runtime</a:t>
+            </a:r>
+          </a:p>
+        </p:txBody>
+      </p:sp>
+      <p:sp>
+        <p:nvSpPr>
+          <p:cNvPr id="3" name="Content Placeholder 2">
             <a:extLst>
               <a:ext uri="{FF2B5EF4-FFF2-40B4-BE49-F238E27FC236}">
-                <a16:creationId xmlns:a16="http://schemas.microsoft.com/office/drawing/2014/main" id="{5F7D5F94-B1BB-436A-B2AC-6BA762B60225}"/>
+                <a16:creationId xmlns:a16="http://schemas.microsoft.com/office/drawing/2014/main" id="{AD40C41E-1B99-4FF4-A8E0-62D686DE4465}"/>
               </a:ext>
             </a:extLst>
           </p:cNvPr>
-          <p:cNvPicPr>
-            <a:picLocks noGrp="1" noChangeAspect="1"/>
-          </p:cNvPicPr>
+          <p:cNvSpPr>
+            <a:spLocks noGrp="1"/>
+          </p:cNvSpPr>
           <p:nvPr>
             <p:ph idx="1"/>
           </p:nvPr>
-        </p:nvPicPr>
-        <p:blipFill>
-          <a:blip r:embed="rId2"/>
-          <a:stretch>
-            <a:fillRect/>
-          </a:stretch>
-        </p:blipFill>
-        <p:spPr>
-          <a:xfrm>
-            <a:off x="3810840" y="975360"/>
-            <a:ext cx="4915901" cy="4897438"/>
-          </a:xfrm>
-          <a:prstGeom prst="rect">
-            <a:avLst/>
-          </a:prstGeom>
-        </p:spPr>
-      </p:pic>
+        </p:nvSpPr>
+        <p:spPr/>
+        <p:txBody>
+          <a:bodyPr/>
+          <a:lstStyle/>
+          <a:p>
+            <a:r>
+              <a:rPr lang="en-US" dirty="0"/>
+              <a:t>Initialize the runtime class with the scaling value</a:t>
+            </a:r>
+          </a:p>
+          <a:p>
+            <a:r>
+              <a:rPr lang="en-US" dirty="0"/>
+              <a:t>Write the runtime to multiplex channels</a:t>
+            </a:r>
+          </a:p>
+          <a:p>
+            <a:r>
+              <a:rPr lang="en-US" dirty="0"/>
+              <a:t>Unit test the runtime. </a:t>
+            </a:r>
+          </a:p>
+        </p:txBody>
+      </p:sp>
     </p:spTree>
     <p:extLst>
       <p:ext uri="{BB962C8B-B14F-4D97-AF65-F5344CB8AC3E}">
-        <p14:creationId xmlns:p14="http://schemas.microsoft.com/office/powerpoint/2010/main" val="4204014354"/>
+        <p14:creationId xmlns:p14="http://schemas.microsoft.com/office/powerpoint/2010/main" val="2925313803"/>
       </p:ext>
     </p:extLst>
   </p:cSld>
@@ -8249,7 +8249,7 @@
           <p:cNvPr id="2" name="Title 1">
             <a:extLst>
               <a:ext uri="{FF2B5EF4-FFF2-40B4-BE49-F238E27FC236}">
-                <a16:creationId xmlns:a16="http://schemas.microsoft.com/office/drawing/2014/main" id="{822001EB-2CB7-4E26-B18C-506200AEA474}"/>
+                <a16:creationId xmlns:a16="http://schemas.microsoft.com/office/drawing/2014/main" id="{05154675-5137-414E-87EB-D615864DF94D}"/>
               </a:ext>
             </a:extLst>
           </p:cNvPr>
@@ -8267,17 +8267,17 @@
           <a:p>
             <a:r>
               <a:rPr lang="en-US" dirty="0"/>
-              <a:t>Line Configuration Dialog</a:t>
+              <a:t>Editor Node</a:t>
             </a:r>
           </a:p>
         </p:txBody>
       </p:sp>
       <p:pic>
         <p:nvPicPr>
-          <p:cNvPr id="4" name="Content Placeholder 3">
+          <p:cNvPr id="5" name="Content Placeholder 4">
             <a:extLst>
               <a:ext uri="{FF2B5EF4-FFF2-40B4-BE49-F238E27FC236}">
-                <a16:creationId xmlns:a16="http://schemas.microsoft.com/office/drawing/2014/main" id="{AE76481A-D222-4EBC-B999-9FC30D00587C}"/>
+                <a16:creationId xmlns:a16="http://schemas.microsoft.com/office/drawing/2014/main" id="{A0D8EE56-EA84-4B7B-AE29-9D9E49E51BDB}"/>
               </a:ext>
             </a:extLst>
           </p:cNvPr>
@@ -8296,8 +8296,8 @@
         </p:blipFill>
         <p:spPr>
           <a:xfrm>
-            <a:off x="1864985" y="974725"/>
-            <a:ext cx="8452505" cy="4897438"/>
+            <a:off x="724480" y="974725"/>
+            <a:ext cx="10733515" cy="4897438"/>
           </a:xfrm>
           <a:prstGeom prst="rect">
             <a:avLst/>
@@ -8307,7 +8307,7 @@
     </p:spTree>
     <p:extLst>
       <p:ext uri="{BB962C8B-B14F-4D97-AF65-F5344CB8AC3E}">
-        <p14:creationId xmlns:p14="http://schemas.microsoft.com/office/powerpoint/2010/main" val="1424009595"/>
+        <p14:creationId xmlns:p14="http://schemas.microsoft.com/office/powerpoint/2010/main" val="1324204237"/>
       </p:ext>
     </p:extLst>
   </p:cSld>
@@ -8336,10 +8336,10 @@
       </p:grpSpPr>
       <p:sp>
         <p:nvSpPr>
-          <p:cNvPr id="4" name="Text Placeholder 3">
+          <p:cNvPr id="2" name="Title 1">
             <a:extLst>
               <a:ext uri="{FF2B5EF4-FFF2-40B4-BE49-F238E27FC236}">
-                <a16:creationId xmlns:a16="http://schemas.microsoft.com/office/drawing/2014/main" id="{05F0C360-DA34-4096-A9CE-E2369516CE5A}"/>
+                <a16:creationId xmlns:a16="http://schemas.microsoft.com/office/drawing/2014/main" id="{62D72453-29A3-44AC-A32B-D6DA3958C0AB}"/>
               </a:ext>
             </a:extLst>
           </p:cNvPr>
@@ -8347,7 +8347,7 @@
             <a:spLocks noGrp="1"/>
           </p:cNvSpPr>
           <p:nvPr>
-            <p:ph type="body" sz="quarter" idx="10"/>
+            <p:ph type="title"/>
           </p:nvPr>
         </p:nvSpPr>
         <p:spPr/>
@@ -8357,15 +8357,47 @@
           <a:p>
             <a:r>
               <a:rPr lang="en-US" dirty="0"/>
-              <a:t>Exercise 3: Editor Node</a:t>
-            </a:r>
-          </a:p>
-        </p:txBody>
-      </p:sp>
+              <a:t>Define Columns</a:t>
+            </a:r>
+          </a:p>
+        </p:txBody>
+      </p:sp>
+      <p:pic>
+        <p:nvPicPr>
+          <p:cNvPr id="4" name="Content Placeholder 3">
+            <a:extLst>
+              <a:ext uri="{FF2B5EF4-FFF2-40B4-BE49-F238E27FC236}">
+                <a16:creationId xmlns:a16="http://schemas.microsoft.com/office/drawing/2014/main" id="{5F7D5F94-B1BB-436A-B2AC-6BA762B60225}"/>
+              </a:ext>
+            </a:extLst>
+          </p:cNvPr>
+          <p:cNvPicPr>
+            <a:picLocks noGrp="1" noChangeAspect="1"/>
+          </p:cNvPicPr>
+          <p:nvPr>
+            <p:ph idx="1"/>
+          </p:nvPr>
+        </p:nvPicPr>
+        <p:blipFill>
+          <a:blip r:embed="rId2"/>
+          <a:stretch>
+            <a:fillRect/>
+          </a:stretch>
+        </p:blipFill>
+        <p:spPr>
+          <a:xfrm>
+            <a:off x="3810840" y="975360"/>
+            <a:ext cx="4915901" cy="4897438"/>
+          </a:xfrm>
+          <a:prstGeom prst="rect">
+            <a:avLst/>
+          </a:prstGeom>
+        </p:spPr>
+      </p:pic>
     </p:spTree>
     <p:extLst>
       <p:ext uri="{BB962C8B-B14F-4D97-AF65-F5344CB8AC3E}">
-        <p14:creationId xmlns:p14="http://schemas.microsoft.com/office/powerpoint/2010/main" val="2444225264"/>
+        <p14:creationId xmlns:p14="http://schemas.microsoft.com/office/powerpoint/2010/main" val="4204014354"/>
       </p:ext>
     </p:extLst>
   </p:cSld>
@@ -8397,7 +8429,7 @@
           <p:cNvPr id="2" name="Title 1">
             <a:extLst>
               <a:ext uri="{FF2B5EF4-FFF2-40B4-BE49-F238E27FC236}">
-                <a16:creationId xmlns:a16="http://schemas.microsoft.com/office/drawing/2014/main" id="{F77F9243-7F60-48A5-8580-6BC70CC45E94}"/>
+                <a16:creationId xmlns:a16="http://schemas.microsoft.com/office/drawing/2014/main" id="{822001EB-2CB7-4E26-B18C-506200AEA474}"/>
               </a:ext>
             </a:extLst>
           </p:cNvPr>
@@ -8415,70 +8447,47 @@
           <a:p>
             <a:r>
               <a:rPr lang="en-US" dirty="0"/>
-              <a:t>Exercise 3: Editor Node</a:t>
-            </a:r>
-          </a:p>
-        </p:txBody>
-      </p:sp>
-      <p:sp>
-        <p:nvSpPr>
-          <p:cNvPr id="3" name="Content Placeholder 2">
+              <a:t>Line Configuration Dialog</a:t>
+            </a:r>
+          </a:p>
+        </p:txBody>
+      </p:sp>
+      <p:pic>
+        <p:nvPicPr>
+          <p:cNvPr id="4" name="Content Placeholder 3">
             <a:extLst>
               <a:ext uri="{FF2B5EF4-FFF2-40B4-BE49-F238E27FC236}">
-                <a16:creationId xmlns:a16="http://schemas.microsoft.com/office/drawing/2014/main" id="{4EF2B063-3914-46F2-9763-B3341F3BB5C8}"/>
+                <a16:creationId xmlns:a16="http://schemas.microsoft.com/office/drawing/2014/main" id="{AE76481A-D222-4EBC-B999-9FC30D00587C}"/>
               </a:ext>
             </a:extLst>
           </p:cNvPr>
-          <p:cNvSpPr>
-            <a:spLocks noGrp="1"/>
-          </p:cNvSpPr>
+          <p:cNvPicPr>
+            <a:picLocks noGrp="1" noChangeAspect="1"/>
+          </p:cNvPicPr>
           <p:nvPr>
             <p:ph idx="1"/>
           </p:nvPr>
-        </p:nvSpPr>
-        <p:spPr/>
-        <p:txBody>
-          <a:bodyPr/>
-          <a:lstStyle/>
-          <a:p>
-            <a:r>
-              <a:rPr lang="en-US" dirty="0"/>
-              <a:t>Define Columns</a:t>
-            </a:r>
-          </a:p>
-          <a:p>
-            <a:r>
-              <a:rPr lang="en-US" dirty="0"/>
-              <a:t>To Table</a:t>
-            </a:r>
-          </a:p>
-          <a:p>
-            <a:r>
-              <a:rPr lang="en-US" dirty="0"/>
-              <a:t>Line Configuration Dialog.</a:t>
-            </a:r>
-          </a:p>
-          <a:p>
-            <a:endParaRPr lang="en-US" dirty="0"/>
-          </a:p>
-          <a:p>
-            <a:endParaRPr lang="en-US" dirty="0"/>
-          </a:p>
-          <a:p>
-            <a:endParaRPr lang="en-US" dirty="0"/>
-          </a:p>
-          <a:p>
-            <a:endParaRPr lang="en-US" dirty="0"/>
-          </a:p>
-          <a:p>
-            <a:endParaRPr lang="en-US" dirty="0"/>
-          </a:p>
-        </p:txBody>
-      </p:sp>
+        </p:nvPicPr>
+        <p:blipFill>
+          <a:blip r:embed="rId2"/>
+          <a:stretch>
+            <a:fillRect/>
+          </a:stretch>
+        </p:blipFill>
+        <p:spPr>
+          <a:xfrm>
+            <a:off x="1864985" y="974725"/>
+            <a:ext cx="8452505" cy="4897438"/>
+          </a:xfrm>
+          <a:prstGeom prst="rect">
+            <a:avLst/>
+          </a:prstGeom>
+        </p:spPr>
+      </p:pic>
     </p:spTree>
     <p:extLst>
       <p:ext uri="{BB962C8B-B14F-4D97-AF65-F5344CB8AC3E}">
-        <p14:creationId xmlns:p14="http://schemas.microsoft.com/office/powerpoint/2010/main" val="3220196452"/>
+        <p14:creationId xmlns:p14="http://schemas.microsoft.com/office/powerpoint/2010/main" val="1424009595"/>
       </p:ext>
     </p:extLst>
   </p:cSld>
@@ -8528,7 +8537,7 @@
           <a:p>
             <a:r>
               <a:rPr lang="en-US" dirty="0"/>
-              <a:t>Exercise 4: Run your module in the engine</a:t>
+              <a:t>Exercise 3: Editor Node</a:t>
             </a:r>
           </a:p>
         </p:txBody>
@@ -8536,7 +8545,7 @@
     </p:spTree>
     <p:extLst>
       <p:ext uri="{BB962C8B-B14F-4D97-AF65-F5344CB8AC3E}">
-        <p14:creationId xmlns:p14="http://schemas.microsoft.com/office/powerpoint/2010/main" val="3184597580"/>
+        <p14:creationId xmlns:p14="http://schemas.microsoft.com/office/powerpoint/2010/main" val="2444225264"/>
       </p:ext>
     </p:extLst>
   </p:cSld>
@@ -8586,6 +8595,184 @@
           <a:p>
             <a:r>
               <a:rPr lang="en-US" dirty="0"/>
+              <a:t>Exercise 3: Editor Node</a:t>
+            </a:r>
+          </a:p>
+        </p:txBody>
+      </p:sp>
+      <p:sp>
+        <p:nvSpPr>
+          <p:cNvPr id="3" name="Content Placeholder 2">
+            <a:extLst>
+              <a:ext uri="{FF2B5EF4-FFF2-40B4-BE49-F238E27FC236}">
+                <a16:creationId xmlns:a16="http://schemas.microsoft.com/office/drawing/2014/main" id="{4EF2B063-3914-46F2-9763-B3341F3BB5C8}"/>
+              </a:ext>
+            </a:extLst>
+          </p:cNvPr>
+          <p:cNvSpPr>
+            <a:spLocks noGrp="1"/>
+          </p:cNvSpPr>
+          <p:nvPr>
+            <p:ph idx="1"/>
+          </p:nvPr>
+        </p:nvSpPr>
+        <p:spPr/>
+        <p:txBody>
+          <a:bodyPr/>
+          <a:lstStyle/>
+          <a:p>
+            <a:r>
+              <a:rPr lang="en-US" dirty="0"/>
+              <a:t>Define Columns</a:t>
+            </a:r>
+          </a:p>
+          <a:p>
+            <a:pPr lvl="1"/>
+            <a:r>
+              <a:rPr lang="en-US" dirty="0"/>
+              <a:t>Callbacks</a:t>
+            </a:r>
+          </a:p>
+          <a:p>
+            <a:r>
+              <a:rPr lang="en-US" dirty="0"/>
+              <a:t>To Table</a:t>
+            </a:r>
+          </a:p>
+          <a:p>
+            <a:r>
+              <a:rPr lang="en-US" dirty="0"/>
+              <a:t>Line Configuration Dialog.</a:t>
+            </a:r>
+          </a:p>
+          <a:p>
+            <a:endParaRPr lang="en-US" dirty="0"/>
+          </a:p>
+          <a:p>
+            <a:endParaRPr lang="en-US" dirty="0"/>
+          </a:p>
+          <a:p>
+            <a:endParaRPr lang="en-US" dirty="0"/>
+          </a:p>
+          <a:p>
+            <a:endParaRPr lang="en-US" dirty="0"/>
+          </a:p>
+          <a:p>
+            <a:endParaRPr lang="en-US" dirty="0"/>
+          </a:p>
+        </p:txBody>
+      </p:sp>
+    </p:spTree>
+    <p:extLst>
+      <p:ext uri="{BB962C8B-B14F-4D97-AF65-F5344CB8AC3E}">
+        <p14:creationId xmlns:p14="http://schemas.microsoft.com/office/powerpoint/2010/main" val="3220196452"/>
+      </p:ext>
+    </p:extLst>
+  </p:cSld>
+  <p:clrMapOvr>
+    <a:masterClrMapping/>
+  </p:clrMapOvr>
+</p:sld>
+</file>
+
+<file path=ppt/slides/slide26.xml><?xml version="1.0" encoding="utf-8"?>
+<p:sld xmlns:a="http://schemas.openxmlformats.org/drawingml/2006/main" xmlns:r="http://schemas.openxmlformats.org/officeDocument/2006/relationships" xmlns:p="http://schemas.openxmlformats.org/presentationml/2006/main">
+  <p:cSld>
+    <p:spTree>
+      <p:nvGrpSpPr>
+        <p:cNvPr id="1" name=""/>
+        <p:cNvGrpSpPr/>
+        <p:nvPr/>
+      </p:nvGrpSpPr>
+      <p:grpSpPr>
+        <a:xfrm>
+          <a:off x="0" y="0"/>
+          <a:ext cx="0" cy="0"/>
+          <a:chOff x="0" y="0"/>
+          <a:chExt cx="0" cy="0"/>
+        </a:xfrm>
+      </p:grpSpPr>
+      <p:sp>
+        <p:nvSpPr>
+          <p:cNvPr id="4" name="Text Placeholder 3">
+            <a:extLst>
+              <a:ext uri="{FF2B5EF4-FFF2-40B4-BE49-F238E27FC236}">
+                <a16:creationId xmlns:a16="http://schemas.microsoft.com/office/drawing/2014/main" id="{05F0C360-DA34-4096-A9CE-E2369516CE5A}"/>
+              </a:ext>
+            </a:extLst>
+          </p:cNvPr>
+          <p:cNvSpPr>
+            <a:spLocks noGrp="1"/>
+          </p:cNvSpPr>
+          <p:nvPr>
+            <p:ph type="body" sz="quarter" idx="10"/>
+          </p:nvPr>
+        </p:nvSpPr>
+        <p:spPr/>
+        <p:txBody>
+          <a:bodyPr/>
+          <a:lstStyle/>
+          <a:p>
+            <a:r>
+              <a:rPr lang="en-US" dirty="0"/>
+              <a:t>Exercise 4: Run your module in the engine</a:t>
+            </a:r>
+          </a:p>
+        </p:txBody>
+      </p:sp>
+    </p:spTree>
+    <p:extLst>
+      <p:ext uri="{BB962C8B-B14F-4D97-AF65-F5344CB8AC3E}">
+        <p14:creationId xmlns:p14="http://schemas.microsoft.com/office/powerpoint/2010/main" val="3184597580"/>
+      </p:ext>
+    </p:extLst>
+  </p:cSld>
+  <p:clrMapOvr>
+    <a:masterClrMapping/>
+  </p:clrMapOvr>
+</p:sld>
+</file>
+
+<file path=ppt/slides/slide27.xml><?xml version="1.0" encoding="utf-8"?>
+<p:sld xmlns:a="http://schemas.openxmlformats.org/drawingml/2006/main" xmlns:r="http://schemas.openxmlformats.org/officeDocument/2006/relationships" xmlns:p="http://schemas.openxmlformats.org/presentationml/2006/main">
+  <p:cSld>
+    <p:spTree>
+      <p:nvGrpSpPr>
+        <p:cNvPr id="1" name=""/>
+        <p:cNvGrpSpPr/>
+        <p:nvPr/>
+      </p:nvGrpSpPr>
+      <p:grpSpPr>
+        <a:xfrm>
+          <a:off x="0" y="0"/>
+          <a:ext cx="0" cy="0"/>
+          <a:chOff x="0" y="0"/>
+          <a:chExt cx="0" cy="0"/>
+        </a:xfrm>
+      </p:grpSpPr>
+      <p:sp>
+        <p:nvSpPr>
+          <p:cNvPr id="2" name="Title 1">
+            <a:extLst>
+              <a:ext uri="{FF2B5EF4-FFF2-40B4-BE49-F238E27FC236}">
+                <a16:creationId xmlns:a16="http://schemas.microsoft.com/office/drawing/2014/main" id="{F77F9243-7F60-48A5-8580-6BC70CC45E94}"/>
+              </a:ext>
+            </a:extLst>
+          </p:cNvPr>
+          <p:cNvSpPr>
+            <a:spLocks noGrp="1"/>
+          </p:cNvSpPr>
+          <p:nvPr>
+            <p:ph type="title"/>
+          </p:nvPr>
+        </p:nvSpPr>
+        <p:spPr/>
+        <p:txBody>
+          <a:bodyPr/>
+          <a:lstStyle/>
+          <a:p>
+            <a:r>
+              <a:rPr lang="en-US" dirty="0"/>
               <a:t>Exercise 4: Running with the module</a:t>
             </a:r>
           </a:p>
@@ -8647,7 +8834,7 @@
 </p:sld>
 </file>
 
-<file path=ppt/slides/slide26.xml><?xml version="1.0" encoding="utf-8"?>
+<file path=ppt/slides/slide28.xml><?xml version="1.0" encoding="utf-8"?>
 <p:sld xmlns:a="http://schemas.openxmlformats.org/drawingml/2006/main" xmlns:r="http://schemas.openxmlformats.org/officeDocument/2006/relationships" xmlns:p="http://schemas.openxmlformats.org/presentationml/2006/main">
   <p:cSld>
     <p:spTree>

</xml_diff>